<commit_message>
working on automatic discovery
</commit_message>
<xml_diff>
--- a/node network.pptx
+++ b/node network.pptx
@@ -108,6 +108,11 @@
       </a:defRPr>
     </a:lvl9pPr>
   </p:defaultTextStyle>
+  <p:extLst>
+    <p:ext uri="{EFAFB233-063F-42B5-8137-9DF3F51BA10A}">
+      <p15:sldGuideLst xmlns:p15="http://schemas.microsoft.com/office/powerpoint/2012/main"/>
+    </p:ext>
+  </p:extLst>
 </p:presentation>
 </file>
 
@@ -156,7 +161,6 @@
               <a:rPr lang="en-US"/>
               <a:t>Click to edit Master title style</a:t>
             </a:r>
-            <a:endParaRPr lang="en-US"/>
           </a:p>
         </p:txBody>
       </p:sp>
@@ -221,7 +225,6 @@
               <a:rPr lang="en-US"/>
               <a:t>Click to edit Master subtitle style</a:t>
             </a:r>
-            <a:endParaRPr lang="en-US"/>
           </a:p>
         </p:txBody>
       </p:sp>
@@ -242,7 +245,7 @@
           <a:p>
             <a:fld id="{06B83C27-2525-4342-9082-7D1EAF504791}" type="datetimeFigureOut">
               <a:rPr lang="en-US" smtClean="0"/>
-              <a:t>6/5/2017</a:t>
+              <a:t>6/6/2017</a:t>
             </a:fld>
             <a:endParaRPr lang="en-US"/>
           </a:p>
@@ -339,7 +342,6 @@
               <a:rPr lang="en-US"/>
               <a:t>Click to edit Master title style</a:t>
             </a:r>
-            <a:endParaRPr lang="en-US"/>
           </a:p>
         </p:txBody>
       </p:sp>
@@ -391,7 +393,6 @@
               <a:rPr lang="en-US"/>
               <a:t>Fifth level</a:t>
             </a:r>
-            <a:endParaRPr lang="en-US"/>
           </a:p>
         </p:txBody>
       </p:sp>
@@ -412,7 +413,7 @@
           <a:p>
             <a:fld id="{06B83C27-2525-4342-9082-7D1EAF504791}" type="datetimeFigureOut">
               <a:rPr lang="en-US" smtClean="0"/>
-              <a:t>6/5/2017</a:t>
+              <a:t>6/6/2017</a:t>
             </a:fld>
             <a:endParaRPr lang="en-US"/>
           </a:p>
@@ -514,7 +515,6 @@
               <a:rPr lang="en-US"/>
               <a:t>Click to edit Master title style</a:t>
             </a:r>
-            <a:endParaRPr lang="en-US"/>
           </a:p>
         </p:txBody>
       </p:sp>
@@ -571,7 +571,6 @@
               <a:rPr lang="en-US"/>
               <a:t>Fifth level</a:t>
             </a:r>
-            <a:endParaRPr lang="en-US"/>
           </a:p>
         </p:txBody>
       </p:sp>
@@ -592,7 +591,7 @@
           <a:p>
             <a:fld id="{06B83C27-2525-4342-9082-7D1EAF504791}" type="datetimeFigureOut">
               <a:rPr lang="en-US" smtClean="0"/>
-              <a:t>6/5/2017</a:t>
+              <a:t>6/6/2017</a:t>
             </a:fld>
             <a:endParaRPr lang="en-US"/>
           </a:p>
@@ -689,7 +688,6 @@
               <a:rPr lang="en-US"/>
               <a:t>Click to edit Master title style</a:t>
             </a:r>
-            <a:endParaRPr lang="en-US"/>
           </a:p>
         </p:txBody>
       </p:sp>
@@ -741,7 +739,6 @@
               <a:rPr lang="en-US"/>
               <a:t>Fifth level</a:t>
             </a:r>
-            <a:endParaRPr lang="en-US"/>
           </a:p>
         </p:txBody>
       </p:sp>
@@ -762,7 +759,7 @@
           <a:p>
             <a:fld id="{06B83C27-2525-4342-9082-7D1EAF504791}" type="datetimeFigureOut">
               <a:rPr lang="en-US" smtClean="0"/>
-              <a:t>6/5/2017</a:t>
+              <a:t>6/6/2017</a:t>
             </a:fld>
             <a:endParaRPr lang="en-US"/>
           </a:p>
@@ -868,7 +865,6 @@
               <a:rPr lang="en-US"/>
               <a:t>Click to edit Master title style</a:t>
             </a:r>
-            <a:endParaRPr lang="en-US"/>
           </a:p>
         </p:txBody>
       </p:sp>
@@ -1008,7 +1004,7 @@
           <a:p>
             <a:fld id="{06B83C27-2525-4342-9082-7D1EAF504791}" type="datetimeFigureOut">
               <a:rPr lang="en-US" smtClean="0"/>
-              <a:t>6/5/2017</a:t>
+              <a:t>6/6/2017</a:t>
             </a:fld>
             <a:endParaRPr lang="en-US"/>
           </a:p>
@@ -1105,7 +1101,6 @@
               <a:rPr lang="en-US"/>
               <a:t>Click to edit Master title style</a:t>
             </a:r>
-            <a:endParaRPr lang="en-US"/>
           </a:p>
         </p:txBody>
       </p:sp>
@@ -1162,7 +1157,6 @@
               <a:rPr lang="en-US"/>
               <a:t>Fifth level</a:t>
             </a:r>
-            <a:endParaRPr lang="en-US"/>
           </a:p>
         </p:txBody>
       </p:sp>
@@ -1219,7 +1213,6 @@
               <a:rPr lang="en-US"/>
               <a:t>Fifth level</a:t>
             </a:r>
-            <a:endParaRPr lang="en-US"/>
           </a:p>
         </p:txBody>
       </p:sp>
@@ -1240,7 +1233,7 @@
           <a:p>
             <a:fld id="{06B83C27-2525-4342-9082-7D1EAF504791}" type="datetimeFigureOut">
               <a:rPr lang="en-US" smtClean="0"/>
-              <a:t>6/5/2017</a:t>
+              <a:t>6/6/2017</a:t>
             </a:fld>
             <a:endParaRPr lang="en-US"/>
           </a:p>
@@ -1342,7 +1335,6 @@
               <a:rPr lang="en-US"/>
               <a:t>Click to edit Master title style</a:t>
             </a:r>
-            <a:endParaRPr lang="en-US"/>
           </a:p>
         </p:txBody>
       </p:sp>
@@ -1464,7 +1456,6 @@
               <a:rPr lang="en-US"/>
               <a:t>Fifth level</a:t>
             </a:r>
-            <a:endParaRPr lang="en-US"/>
           </a:p>
         </p:txBody>
       </p:sp>
@@ -1586,7 +1577,6 @@
               <a:rPr lang="en-US"/>
               <a:t>Fifth level</a:t>
             </a:r>
-            <a:endParaRPr lang="en-US"/>
           </a:p>
         </p:txBody>
       </p:sp>
@@ -1607,7 +1597,7 @@
           <a:p>
             <a:fld id="{06B83C27-2525-4342-9082-7D1EAF504791}" type="datetimeFigureOut">
               <a:rPr lang="en-US" smtClean="0"/>
-              <a:t>6/5/2017</a:t>
+              <a:t>6/6/2017</a:t>
             </a:fld>
             <a:endParaRPr lang="en-US"/>
           </a:p>
@@ -1704,7 +1694,6 @@
               <a:rPr lang="en-US"/>
               <a:t>Click to edit Master title style</a:t>
             </a:r>
-            <a:endParaRPr lang="en-US"/>
           </a:p>
         </p:txBody>
       </p:sp>
@@ -1725,7 +1714,7 @@
           <a:p>
             <a:fld id="{06B83C27-2525-4342-9082-7D1EAF504791}" type="datetimeFigureOut">
               <a:rPr lang="en-US" smtClean="0"/>
-              <a:t>6/5/2017</a:t>
+              <a:t>6/6/2017</a:t>
             </a:fld>
             <a:endParaRPr lang="en-US"/>
           </a:p>
@@ -1820,7 +1809,7 @@
           <a:p>
             <a:fld id="{06B83C27-2525-4342-9082-7D1EAF504791}" type="datetimeFigureOut">
               <a:rPr lang="en-US" smtClean="0"/>
-              <a:t>6/5/2017</a:t>
+              <a:t>6/6/2017</a:t>
             </a:fld>
             <a:endParaRPr lang="en-US"/>
           </a:p>
@@ -1926,7 +1915,6 @@
               <a:rPr lang="en-US"/>
               <a:t>Click to edit Master title style</a:t>
             </a:r>
-            <a:endParaRPr lang="en-US"/>
           </a:p>
         </p:txBody>
       </p:sp>
@@ -2011,7 +1999,6 @@
               <a:rPr lang="en-US"/>
               <a:t>Fifth level</a:t>
             </a:r>
-            <a:endParaRPr lang="en-US"/>
           </a:p>
         </p:txBody>
       </p:sp>
@@ -2097,7 +2084,7 @@
           <a:p>
             <a:fld id="{06B83C27-2525-4342-9082-7D1EAF504791}" type="datetimeFigureOut">
               <a:rPr lang="en-US" smtClean="0"/>
-              <a:t>6/5/2017</a:t>
+              <a:t>6/6/2017</a:t>
             </a:fld>
             <a:endParaRPr lang="en-US"/>
           </a:p>
@@ -2203,7 +2190,6 @@
               <a:rPr lang="en-US"/>
               <a:t>Click to edit Master title style</a:t>
             </a:r>
-            <a:endParaRPr lang="en-US"/>
           </a:p>
         </p:txBody>
       </p:sp>
@@ -2350,7 +2336,7 @@
           <a:p>
             <a:fld id="{06B83C27-2525-4342-9082-7D1EAF504791}" type="datetimeFigureOut">
               <a:rPr lang="en-US" smtClean="0"/>
-              <a:t>6/5/2017</a:t>
+              <a:t>6/6/2017</a:t>
             </a:fld>
             <a:endParaRPr lang="en-US"/>
           </a:p>
@@ -2462,7 +2448,6 @@
               <a:rPr lang="en-US"/>
               <a:t>Click to edit Master title style</a:t>
             </a:r>
-            <a:endParaRPr lang="en-US"/>
           </a:p>
         </p:txBody>
       </p:sp>
@@ -2524,7 +2509,6 @@
               <a:rPr lang="en-US"/>
               <a:t>Fifth level</a:t>
             </a:r>
-            <a:endParaRPr lang="en-US"/>
           </a:p>
         </p:txBody>
       </p:sp>
@@ -2563,7 +2547,7 @@
           <a:p>
             <a:fld id="{06B83C27-2525-4342-9082-7D1EAF504791}" type="datetimeFigureOut">
               <a:rPr lang="en-US" smtClean="0"/>
-              <a:t>6/5/2017</a:t>
+              <a:t>6/6/2017</a:t>
             </a:fld>
             <a:endParaRPr lang="en-US"/>
           </a:p>
@@ -4508,7 +4492,7 @@
           <a:p>
             <a:r>
               <a:rPr lang="en-US" dirty="0"/>
-              <a:t>Give me connected nodes!!</a:t>
+              <a:t>Give me connected node info!!</a:t>
             </a:r>
           </a:p>
         </p:txBody>
@@ -4972,7 +4956,7 @@
           <a:p>
             <a:r>
               <a:rPr lang="en-US" dirty="0"/>
-              <a:t>Let me connect to these guys</a:t>
+              <a:t>Let me connect to these guys*</a:t>
             </a:r>
           </a:p>
         </p:txBody>
@@ -5342,6 +5326,35 @@
           </a:fontRef>
         </p:style>
       </p:cxnSp>
+      <p:sp>
+        <p:nvSpPr>
+          <p:cNvPr id="31" name="TextBox 30"/>
+          <p:cNvSpPr txBox="1"/>
+          <p:nvPr/>
+        </p:nvSpPr>
+        <p:spPr>
+          <a:xfrm>
+            <a:off x="9142182" y="6228023"/>
+            <a:ext cx="3015754" cy="646331"/>
+          </a:xfrm>
+          <a:prstGeom prst="rect">
+            <a:avLst/>
+          </a:prstGeom>
+          <a:noFill/>
+        </p:spPr>
+        <p:txBody>
+          <a:bodyPr wrap="square" rtlCol="0">
+            <a:spAutoFit/>
+          </a:bodyPr>
+          <a:lstStyle/>
+          <a:p>
+            <a:r>
+              <a:rPr lang="en-US" dirty="0"/>
+              <a:t>*All nodes connected to each other</a:t>
+            </a:r>
+          </a:p>
+        </p:txBody>
+      </p:sp>
     </p:spTree>
     <p:extLst>
       <p:ext uri="{BB962C8B-B14F-4D97-AF65-F5344CB8AC3E}">

</xml_diff>

<commit_message>
implemented ros based pubsib
</commit_message>
<xml_diff>
--- a/node network.pptx
+++ b/node network.pptx
@@ -245,7 +245,7 @@
           <a:p>
             <a:fld id="{06B83C27-2525-4342-9082-7D1EAF504791}" type="datetimeFigureOut">
               <a:rPr lang="en-US" smtClean="0"/>
-              <a:t>6/6/2017</a:t>
+              <a:t>6/12/2017</a:t>
             </a:fld>
             <a:endParaRPr lang="en-US"/>
           </a:p>
@@ -413,7 +413,7 @@
           <a:p>
             <a:fld id="{06B83C27-2525-4342-9082-7D1EAF504791}" type="datetimeFigureOut">
               <a:rPr lang="en-US" smtClean="0"/>
-              <a:t>6/6/2017</a:t>
+              <a:t>6/12/2017</a:t>
             </a:fld>
             <a:endParaRPr lang="en-US"/>
           </a:p>
@@ -591,7 +591,7 @@
           <a:p>
             <a:fld id="{06B83C27-2525-4342-9082-7D1EAF504791}" type="datetimeFigureOut">
               <a:rPr lang="en-US" smtClean="0"/>
-              <a:t>6/6/2017</a:t>
+              <a:t>6/12/2017</a:t>
             </a:fld>
             <a:endParaRPr lang="en-US"/>
           </a:p>
@@ -759,7 +759,7 @@
           <a:p>
             <a:fld id="{06B83C27-2525-4342-9082-7D1EAF504791}" type="datetimeFigureOut">
               <a:rPr lang="en-US" smtClean="0"/>
-              <a:t>6/6/2017</a:t>
+              <a:t>6/12/2017</a:t>
             </a:fld>
             <a:endParaRPr lang="en-US"/>
           </a:p>
@@ -1004,7 +1004,7 @@
           <a:p>
             <a:fld id="{06B83C27-2525-4342-9082-7D1EAF504791}" type="datetimeFigureOut">
               <a:rPr lang="en-US" smtClean="0"/>
-              <a:t>6/6/2017</a:t>
+              <a:t>6/12/2017</a:t>
             </a:fld>
             <a:endParaRPr lang="en-US"/>
           </a:p>
@@ -1233,7 +1233,7 @@
           <a:p>
             <a:fld id="{06B83C27-2525-4342-9082-7D1EAF504791}" type="datetimeFigureOut">
               <a:rPr lang="en-US" smtClean="0"/>
-              <a:t>6/6/2017</a:t>
+              <a:t>6/12/2017</a:t>
             </a:fld>
             <a:endParaRPr lang="en-US"/>
           </a:p>
@@ -1597,7 +1597,7 @@
           <a:p>
             <a:fld id="{06B83C27-2525-4342-9082-7D1EAF504791}" type="datetimeFigureOut">
               <a:rPr lang="en-US" smtClean="0"/>
-              <a:t>6/6/2017</a:t>
+              <a:t>6/12/2017</a:t>
             </a:fld>
             <a:endParaRPr lang="en-US"/>
           </a:p>
@@ -1714,7 +1714,7 @@
           <a:p>
             <a:fld id="{06B83C27-2525-4342-9082-7D1EAF504791}" type="datetimeFigureOut">
               <a:rPr lang="en-US" smtClean="0"/>
-              <a:t>6/6/2017</a:t>
+              <a:t>6/12/2017</a:t>
             </a:fld>
             <a:endParaRPr lang="en-US"/>
           </a:p>
@@ -1809,7 +1809,7 @@
           <a:p>
             <a:fld id="{06B83C27-2525-4342-9082-7D1EAF504791}" type="datetimeFigureOut">
               <a:rPr lang="en-US" smtClean="0"/>
-              <a:t>6/6/2017</a:t>
+              <a:t>6/12/2017</a:t>
             </a:fld>
             <a:endParaRPr lang="en-US"/>
           </a:p>
@@ -2084,7 +2084,7 @@
           <a:p>
             <a:fld id="{06B83C27-2525-4342-9082-7D1EAF504791}" type="datetimeFigureOut">
               <a:rPr lang="en-US" smtClean="0"/>
-              <a:t>6/6/2017</a:t>
+              <a:t>6/12/2017</a:t>
             </a:fld>
             <a:endParaRPr lang="en-US"/>
           </a:p>
@@ -2336,7 +2336,7 @@
           <a:p>
             <a:fld id="{06B83C27-2525-4342-9082-7D1EAF504791}" type="datetimeFigureOut">
               <a:rPr lang="en-US" smtClean="0"/>
-              <a:t>6/6/2017</a:t>
+              <a:t>6/12/2017</a:t>
             </a:fld>
             <a:endParaRPr lang="en-US"/>
           </a:p>
@@ -2547,7 +2547,7 @@
           <a:p>
             <a:fld id="{06B83C27-2525-4342-9082-7D1EAF504791}" type="datetimeFigureOut">
               <a:rPr lang="en-US" smtClean="0"/>
-              <a:t>6/6/2017</a:t>
+              <a:t>6/12/2017</a:t>
             </a:fld>
             <a:endParaRPr lang="en-US"/>
           </a:p>

</xml_diff>